<commit_message>
Rename mobile app folder
</commit_message>
<xml_diff>
--- a/WhatsClub.pptx
+++ b/WhatsClub.pptx
@@ -7,14 +7,14 @@
   <p:sldIdLst>
     <p:sldId id="256" r:id="rId2"/>
     <p:sldId id="257" r:id="rId3"/>
-    <p:sldId id="258" r:id="rId4"/>
-    <p:sldId id="259" r:id="rId5"/>
-    <p:sldId id="260" r:id="rId6"/>
-    <p:sldId id="261" r:id="rId7"/>
-    <p:sldId id="262" r:id="rId8"/>
-    <p:sldId id="263" r:id="rId9"/>
-    <p:sldId id="264" r:id="rId10"/>
-    <p:sldId id="266" r:id="rId11"/>
+    <p:sldId id="270" r:id="rId4"/>
+    <p:sldId id="269" r:id="rId5"/>
+    <p:sldId id="258" r:id="rId6"/>
+    <p:sldId id="259" r:id="rId7"/>
+    <p:sldId id="260" r:id="rId8"/>
+    <p:sldId id="264" r:id="rId9"/>
+    <p:sldId id="262" r:id="rId10"/>
+    <p:sldId id="271" r:id="rId11"/>
     <p:sldId id="267" r:id="rId12"/>
   </p:sldIdLst>
   <p:sldSz cx="12192000" cy="6858000"/>
@@ -269,7 +269,7 @@
           <a:p>
             <a:fld id="{F15C8759-D5AC-422C-B7D3-B3F7D659B04E}" type="datetimeFigureOut">
               <a:rPr lang="en-US" smtClean="0"/>
-              <a:t>3/7/2021</a:t>
+              <a:t>3/11/2021</a:t>
             </a:fld>
             <a:endParaRPr lang="en-US"/>
           </a:p>
@@ -467,7 +467,7 @@
           <a:p>
             <a:fld id="{F15C8759-D5AC-422C-B7D3-B3F7D659B04E}" type="datetimeFigureOut">
               <a:rPr lang="en-US" smtClean="0"/>
-              <a:t>3/7/2021</a:t>
+              <a:t>3/11/2021</a:t>
             </a:fld>
             <a:endParaRPr lang="en-US"/>
           </a:p>
@@ -675,7 +675,7 @@
           <a:p>
             <a:fld id="{F15C8759-D5AC-422C-B7D3-B3F7D659B04E}" type="datetimeFigureOut">
               <a:rPr lang="en-US" smtClean="0"/>
-              <a:t>3/7/2021</a:t>
+              <a:t>3/11/2021</a:t>
             </a:fld>
             <a:endParaRPr lang="en-US"/>
           </a:p>
@@ -873,7 +873,7 @@
           <a:p>
             <a:fld id="{F15C8759-D5AC-422C-B7D3-B3F7D659B04E}" type="datetimeFigureOut">
               <a:rPr lang="en-US" smtClean="0"/>
-              <a:t>3/7/2021</a:t>
+              <a:t>3/11/2021</a:t>
             </a:fld>
             <a:endParaRPr lang="en-US"/>
           </a:p>
@@ -1148,7 +1148,7 @@
           <a:p>
             <a:fld id="{F15C8759-D5AC-422C-B7D3-B3F7D659B04E}" type="datetimeFigureOut">
               <a:rPr lang="en-US" smtClean="0"/>
-              <a:t>3/7/2021</a:t>
+              <a:t>3/11/2021</a:t>
             </a:fld>
             <a:endParaRPr lang="en-US"/>
           </a:p>
@@ -1413,7 +1413,7 @@
           <a:p>
             <a:fld id="{F15C8759-D5AC-422C-B7D3-B3F7D659B04E}" type="datetimeFigureOut">
               <a:rPr lang="en-US" smtClean="0"/>
-              <a:t>3/7/2021</a:t>
+              <a:t>3/11/2021</a:t>
             </a:fld>
             <a:endParaRPr lang="en-US"/>
           </a:p>
@@ -1825,7 +1825,7 @@
           <a:p>
             <a:fld id="{F15C8759-D5AC-422C-B7D3-B3F7D659B04E}" type="datetimeFigureOut">
               <a:rPr lang="en-US" smtClean="0"/>
-              <a:t>3/7/2021</a:t>
+              <a:t>3/11/2021</a:t>
             </a:fld>
             <a:endParaRPr lang="en-US"/>
           </a:p>
@@ -1966,7 +1966,7 @@
           <a:p>
             <a:fld id="{F15C8759-D5AC-422C-B7D3-B3F7D659B04E}" type="datetimeFigureOut">
               <a:rPr lang="en-US" smtClean="0"/>
-              <a:t>3/7/2021</a:t>
+              <a:t>3/11/2021</a:t>
             </a:fld>
             <a:endParaRPr lang="en-US"/>
           </a:p>
@@ -2079,7 +2079,7 @@
           <a:p>
             <a:fld id="{F15C8759-D5AC-422C-B7D3-B3F7D659B04E}" type="datetimeFigureOut">
               <a:rPr lang="en-US" smtClean="0"/>
-              <a:t>3/7/2021</a:t>
+              <a:t>3/11/2021</a:t>
             </a:fld>
             <a:endParaRPr lang="en-US"/>
           </a:p>
@@ -2390,7 +2390,7 @@
           <a:p>
             <a:fld id="{F15C8759-D5AC-422C-B7D3-B3F7D659B04E}" type="datetimeFigureOut">
               <a:rPr lang="en-US" smtClean="0"/>
-              <a:t>3/7/2021</a:t>
+              <a:t>3/11/2021</a:t>
             </a:fld>
             <a:endParaRPr lang="en-US"/>
           </a:p>
@@ -2678,7 +2678,7 @@
           <a:p>
             <a:fld id="{F15C8759-D5AC-422C-B7D3-B3F7D659B04E}" type="datetimeFigureOut">
               <a:rPr lang="en-US" smtClean="0"/>
-              <a:t>3/7/2021</a:t>
+              <a:t>3/11/2021</a:t>
             </a:fld>
             <a:endParaRPr lang="en-US"/>
           </a:p>
@@ -2919,7 +2919,7 @@
           <a:p>
             <a:fld id="{F15C8759-D5AC-422C-B7D3-B3F7D659B04E}" type="datetimeFigureOut">
               <a:rPr lang="en-US" smtClean="0"/>
-              <a:t>3/7/2021</a:t>
+              <a:t>3/11/2021</a:t>
             </a:fld>
             <a:endParaRPr lang="en-US"/>
           </a:p>
@@ -3355,57 +3355,41 @@
         <p:spPr/>
         <p:txBody>
           <a:bodyPr>
-            <a:normAutofit fontScale="90000"/>
+            <a:normAutofit/>
           </a:bodyPr>
           <a:lstStyle/>
           <a:p>
             <a:r>
-              <a:rPr lang="en-US" dirty="0" err="1"/>
-              <a:t>Passwordless</a:t>
-            </a:r>
-            <a:r>
               <a:rPr lang="en-US" dirty="0"/>
-              <a:t> login into Web app</a:t>
-            </a:r>
-            <a:br>
+              <a:t>Full Stack JS Practice</a:t>
+            </a:r>
+          </a:p>
+        </p:txBody>
+      </p:sp>
+      <p:sp>
+        <p:nvSpPr>
+          <p:cNvPr id="3" name="Subtitle 2">
+            <a:extLst>
+              <a:ext uri="{FF2B5EF4-FFF2-40B4-BE49-F238E27FC236}">
+                <a16:creationId xmlns:a16="http://schemas.microsoft.com/office/drawing/2014/main" id="{3F3A0E12-AE2C-42A7-A2DF-91A2FD5AA95E}"/>
+              </a:ext>
+            </a:extLst>
+          </p:cNvPr>
+          <p:cNvSpPr>
+            <a:spLocks noGrp="1"/>
+          </p:cNvSpPr>
+          <p:nvPr>
+            <p:ph type="subTitle" idx="1"/>
+          </p:nvPr>
+        </p:nvSpPr>
+        <p:spPr/>
+        <p:txBody>
+          <a:bodyPr/>
+          <a:lstStyle/>
+          <a:p>
+            <a:r>
               <a:rPr lang="en-US" dirty="0"/>
-            </a:br>
-            <a:endParaRPr lang="en-US" dirty="0"/>
-          </a:p>
-        </p:txBody>
-      </p:sp>
-      <p:sp>
-        <p:nvSpPr>
-          <p:cNvPr id="3" name="Subtitle 2">
-            <a:extLst>
-              <a:ext uri="{FF2B5EF4-FFF2-40B4-BE49-F238E27FC236}">
-                <a16:creationId xmlns:a16="http://schemas.microsoft.com/office/drawing/2014/main" id="{3F3A0E12-AE2C-42A7-A2DF-91A2FD5AA95E}"/>
-              </a:ext>
-            </a:extLst>
-          </p:cNvPr>
-          <p:cNvSpPr>
-            <a:spLocks noGrp="1"/>
-          </p:cNvSpPr>
-          <p:nvPr>
-            <p:ph type="subTitle" idx="1"/>
-          </p:nvPr>
-        </p:nvSpPr>
-        <p:spPr/>
-        <p:txBody>
-          <a:bodyPr/>
-          <a:lstStyle/>
-          <a:p>
-            <a:r>
-              <a:rPr lang="en-US" dirty="0"/>
-              <a:t>based on </a:t>
-            </a:r>
-            <a:r>
-              <a:rPr lang="en-US" dirty="0" err="1"/>
-              <a:t>WhatsClub</a:t>
-            </a:r>
-            <a:r>
-              <a:rPr lang="en-US" dirty="0"/>
-              <a:t> app</a:t>
+              <a:t>based on QR login feature</a:t>
             </a:r>
           </a:p>
         </p:txBody>
@@ -3445,7 +3429,7 @@
           <p:cNvPr id="2" name="Title 1">
             <a:extLst>
               <a:ext uri="{FF2B5EF4-FFF2-40B4-BE49-F238E27FC236}">
-                <a16:creationId xmlns:a16="http://schemas.microsoft.com/office/drawing/2014/main" id="{CCFFD000-366D-4F12-A4FB-17F2D02CD785}"/>
+                <a16:creationId xmlns:a16="http://schemas.microsoft.com/office/drawing/2014/main" id="{A5A94723-1639-49C6-B4FC-0EFE23CB98A3}"/>
               </a:ext>
             </a:extLst>
           </p:cNvPr>
@@ -3456,48 +3440,22 @@
             <p:ph type="title"/>
           </p:nvPr>
         </p:nvSpPr>
-        <p:spPr/>
-        <p:txBody>
-          <a:bodyPr/>
-          <a:lstStyle/>
-          <a:p>
-            <a:r>
-              <a:rPr lang="en-US" dirty="0"/>
-              <a:t>Open Questions</a:t>
-            </a:r>
-          </a:p>
-        </p:txBody>
-      </p:sp>
-      <p:sp>
-        <p:nvSpPr>
-          <p:cNvPr id="3" name="Content Placeholder 2">
-            <a:extLst>
-              <a:ext uri="{FF2B5EF4-FFF2-40B4-BE49-F238E27FC236}">
-                <a16:creationId xmlns:a16="http://schemas.microsoft.com/office/drawing/2014/main" id="{649F7472-FC36-4B68-8684-281384113398}"/>
-              </a:ext>
-            </a:extLst>
-          </p:cNvPr>
-          <p:cNvSpPr>
-            <a:spLocks noGrp="1"/>
-          </p:cNvSpPr>
-          <p:nvPr>
-            <p:ph idx="1"/>
-          </p:nvPr>
-        </p:nvSpPr>
-        <p:spPr/>
-        <p:txBody>
-          <a:bodyPr/>
-          <a:lstStyle/>
-          <a:p>
-            <a:r>
-              <a:rPr lang="en-US" dirty="0"/>
-              <a:t>How to scale backend horizontally?</a:t>
-            </a:r>
-          </a:p>
-          <a:p>
-            <a:r>
-              <a:rPr lang="en-US" dirty="0"/>
-              <a:t>How to protect against attacks of stealing the access token?</a:t>
+        <p:spPr>
+          <a:xfrm>
+            <a:off x="838200" y="2766218"/>
+            <a:ext cx="10515600" cy="1325563"/>
+          </a:xfrm>
+        </p:spPr>
+        <p:txBody>
+          <a:bodyPr>
+            <a:normAutofit/>
+          </a:bodyPr>
+          <a:lstStyle/>
+          <a:p>
+            <a:pPr algn="ctr"/>
+            <a:r>
+              <a:rPr lang="en-US" sz="6600" dirty="0"/>
+              <a:t>Lets dive deeper</a:t>
             </a:r>
           </a:p>
         </p:txBody>
@@ -3505,7 +3463,7 @@
     </p:spTree>
     <p:extLst>
       <p:ext uri="{BB962C8B-B14F-4D97-AF65-F5344CB8AC3E}">
-        <p14:creationId xmlns:p14="http://schemas.microsoft.com/office/powerpoint/2010/main" val="1663037214"/>
+        <p14:creationId xmlns:p14="http://schemas.microsoft.com/office/powerpoint/2010/main" val="404807634"/>
       </p:ext>
     </p:extLst>
   </p:cSld>
@@ -3550,7 +3508,7 @@
         </p:nvSpPr>
         <p:spPr>
           <a:xfrm>
-            <a:off x="838200" y="2103437"/>
+            <a:off x="838200" y="2766218"/>
             <a:ext cx="10515600" cy="1325563"/>
           </a:xfrm>
         </p:spPr>
@@ -3621,13 +3579,8 @@
           <a:p>
             <a:r>
               <a:rPr lang="en-US" dirty="0"/>
-              <a:t>What is </a:t>
-            </a:r>
-            <a:r>
-              <a:rPr lang="en-US" dirty="0" err="1"/>
-              <a:t>WhatsClub</a:t>
-            </a:r>
-            <a:endParaRPr lang="en-US" dirty="0"/>
+              <a:t>Scope of practice</a:t>
+            </a:r>
           </a:p>
         </p:txBody>
       </p:sp>
@@ -3654,68 +3607,43 @@
           <a:p>
             <a:r>
               <a:rPr lang="en-US" dirty="0"/>
-              <a:t>Artificial application when Users can create clubs or audio chats to say “</a:t>
-            </a:r>
-            <a:r>
-              <a:rPr lang="en-US" dirty="0" err="1"/>
-              <a:t>Whats</a:t>
-            </a:r>
+              <a:t>JavaScript</a:t>
+            </a:r>
+          </a:p>
+          <a:p>
             <a:r>
               <a:rPr lang="en-US" dirty="0"/>
-              <a:t> Up” each other.</a:t>
+              <a:t>React </a:t>
             </a:r>
           </a:p>
           <a:p>
             <a:r>
               <a:rPr lang="en-US" dirty="0"/>
-              <a:t>Users are a big company employees.</a:t>
+              <a:t>React Native</a:t>
             </a:r>
           </a:p>
           <a:p>
             <a:r>
               <a:rPr lang="en-US" dirty="0"/>
-              <a:t>Main components:</a:t>
-            </a:r>
-          </a:p>
-          <a:p>
-            <a:pPr lvl="1"/>
-            <a:r>
-              <a:rPr lang="en-US" dirty="0" err="1"/>
-              <a:t>Whatsclub</a:t>
-            </a:r>
+              <a:t>Node.js</a:t>
+            </a:r>
+          </a:p>
+          <a:p>
             <a:r>
               <a:rPr lang="en-US" dirty="0"/>
-              <a:t> Backend API on NodeJS (JS)</a:t>
-            </a:r>
-          </a:p>
-          <a:p>
-            <a:pPr lvl="1"/>
-            <a:r>
-              <a:rPr lang="en-US" dirty="0" err="1"/>
-              <a:t>Whatsclub</a:t>
-            </a:r>
+              <a:t>JWT</a:t>
+            </a:r>
+          </a:p>
+          <a:p>
             <a:r>
               <a:rPr lang="en-US" dirty="0"/>
-              <a:t> Mobile App on </a:t>
-            </a:r>
-            <a:r>
-              <a:rPr lang="en-US" dirty="0" err="1"/>
-              <a:t>ReactNative</a:t>
-            </a:r>
+              <a:t>QR codes</a:t>
+            </a:r>
+          </a:p>
+          <a:p>
             <a:r>
               <a:rPr lang="en-US" dirty="0"/>
-              <a:t> (JS)</a:t>
-            </a:r>
-          </a:p>
-          <a:p>
-            <a:pPr lvl="1"/>
-            <a:r>
-              <a:rPr lang="en-US" dirty="0" err="1"/>
-              <a:t>Whatsclub</a:t>
-            </a:r>
-            <a:r>
-              <a:rPr lang="en-US" dirty="0"/>
-              <a:t> Web App on React (JS)</a:t>
+              <a:t>(bonus) Redis</a:t>
             </a:r>
           </a:p>
         </p:txBody>
@@ -3734,6 +3662,255 @@
 </file>
 
 <file path=ppt/slides/slide3.xml><?xml version="1.0" encoding="utf-8"?>
+<p:sld xmlns:a="http://schemas.openxmlformats.org/drawingml/2006/main" xmlns:r="http://schemas.openxmlformats.org/officeDocument/2006/relationships" xmlns:p="http://schemas.openxmlformats.org/presentationml/2006/main">
+  <p:cSld>
+    <p:spTree>
+      <p:nvGrpSpPr>
+        <p:cNvPr id="1" name=""/>
+        <p:cNvGrpSpPr/>
+        <p:nvPr/>
+      </p:nvGrpSpPr>
+      <p:grpSpPr>
+        <a:xfrm>
+          <a:off x="0" y="0"/>
+          <a:ext cx="0" cy="0"/>
+          <a:chOff x="0" y="0"/>
+          <a:chExt cx="0" cy="0"/>
+        </a:xfrm>
+      </p:grpSpPr>
+      <p:sp>
+        <p:nvSpPr>
+          <p:cNvPr id="2" name="Title 1">
+            <a:extLst>
+              <a:ext uri="{FF2B5EF4-FFF2-40B4-BE49-F238E27FC236}">
+                <a16:creationId xmlns:a16="http://schemas.microsoft.com/office/drawing/2014/main" id="{C7BCE768-5871-487B-9200-7DB897E0AFF7}"/>
+              </a:ext>
+            </a:extLst>
+          </p:cNvPr>
+          <p:cNvSpPr>
+            <a:spLocks noGrp="1"/>
+          </p:cNvSpPr>
+          <p:nvPr>
+            <p:ph type="ctrTitle"/>
+          </p:nvPr>
+        </p:nvSpPr>
+        <p:spPr/>
+        <p:txBody>
+          <a:bodyPr>
+            <a:normAutofit/>
+          </a:bodyPr>
+          <a:lstStyle/>
+          <a:p>
+            <a:r>
+              <a:rPr lang="en-US" dirty="0" err="1"/>
+              <a:t>WhatsClub</a:t>
+            </a:r>
+            <a:endParaRPr lang="en-US" dirty="0"/>
+          </a:p>
+        </p:txBody>
+      </p:sp>
+      <p:sp>
+        <p:nvSpPr>
+          <p:cNvPr id="3" name="Subtitle 2">
+            <a:extLst>
+              <a:ext uri="{FF2B5EF4-FFF2-40B4-BE49-F238E27FC236}">
+                <a16:creationId xmlns:a16="http://schemas.microsoft.com/office/drawing/2014/main" id="{3F3A0E12-AE2C-42A7-A2DF-91A2FD5AA95E}"/>
+              </a:ext>
+            </a:extLst>
+          </p:cNvPr>
+          <p:cNvSpPr>
+            <a:spLocks noGrp="1"/>
+          </p:cNvSpPr>
+          <p:nvPr>
+            <p:ph type="subTitle" idx="1"/>
+          </p:nvPr>
+        </p:nvSpPr>
+        <p:spPr/>
+        <p:txBody>
+          <a:bodyPr/>
+          <a:lstStyle/>
+          <a:p>
+            <a:r>
+              <a:rPr lang="en-US" dirty="0"/>
+              <a:t>make clubs to send “</a:t>
+            </a:r>
+            <a:r>
+              <a:rPr lang="en-US" dirty="0" err="1"/>
+              <a:t>whats</a:t>
+            </a:r>
+            <a:r>
+              <a:rPr lang="en-US" dirty="0"/>
+              <a:t> up” to your peers</a:t>
+            </a:r>
+          </a:p>
+        </p:txBody>
+      </p:sp>
+    </p:spTree>
+    <p:extLst>
+      <p:ext uri="{BB962C8B-B14F-4D97-AF65-F5344CB8AC3E}">
+        <p14:creationId xmlns:p14="http://schemas.microsoft.com/office/powerpoint/2010/main" val="3140677480"/>
+      </p:ext>
+    </p:extLst>
+  </p:cSld>
+  <p:clrMapOvr>
+    <a:masterClrMapping/>
+  </p:clrMapOvr>
+</p:sld>
+</file>
+
+<file path=ppt/slides/slide4.xml><?xml version="1.0" encoding="utf-8"?>
+<p:sld xmlns:a="http://schemas.openxmlformats.org/drawingml/2006/main" xmlns:r="http://schemas.openxmlformats.org/officeDocument/2006/relationships" xmlns:p="http://schemas.openxmlformats.org/presentationml/2006/main">
+  <p:cSld>
+    <p:spTree>
+      <p:nvGrpSpPr>
+        <p:cNvPr id="1" name=""/>
+        <p:cNvGrpSpPr/>
+        <p:nvPr/>
+      </p:nvGrpSpPr>
+      <p:grpSpPr>
+        <a:xfrm>
+          <a:off x="0" y="0"/>
+          <a:ext cx="0" cy="0"/>
+          <a:chOff x="0" y="0"/>
+          <a:chExt cx="0" cy="0"/>
+        </a:xfrm>
+      </p:grpSpPr>
+      <p:sp>
+        <p:nvSpPr>
+          <p:cNvPr id="2" name="Title 1">
+            <a:extLst>
+              <a:ext uri="{FF2B5EF4-FFF2-40B4-BE49-F238E27FC236}">
+                <a16:creationId xmlns:a16="http://schemas.microsoft.com/office/drawing/2014/main" id="{CCFFD000-366D-4F12-A4FB-17F2D02CD785}"/>
+              </a:ext>
+            </a:extLst>
+          </p:cNvPr>
+          <p:cNvSpPr>
+            <a:spLocks noGrp="1"/>
+          </p:cNvSpPr>
+          <p:nvPr>
+            <p:ph type="title"/>
+          </p:nvPr>
+        </p:nvSpPr>
+        <p:spPr/>
+        <p:txBody>
+          <a:bodyPr/>
+          <a:lstStyle/>
+          <a:p>
+            <a:r>
+              <a:rPr lang="en-US" dirty="0"/>
+              <a:t>What is </a:t>
+            </a:r>
+            <a:r>
+              <a:rPr lang="en-US" dirty="0" err="1"/>
+              <a:t>WhatsClub</a:t>
+            </a:r>
+            <a:endParaRPr lang="en-US" dirty="0"/>
+          </a:p>
+        </p:txBody>
+      </p:sp>
+      <p:sp>
+        <p:nvSpPr>
+          <p:cNvPr id="3" name="Content Placeholder 2">
+            <a:extLst>
+              <a:ext uri="{FF2B5EF4-FFF2-40B4-BE49-F238E27FC236}">
+                <a16:creationId xmlns:a16="http://schemas.microsoft.com/office/drawing/2014/main" id="{649F7472-FC36-4B68-8684-281384113398}"/>
+              </a:ext>
+            </a:extLst>
+          </p:cNvPr>
+          <p:cNvSpPr>
+            <a:spLocks noGrp="1"/>
+          </p:cNvSpPr>
+          <p:nvPr>
+            <p:ph idx="1"/>
+          </p:nvPr>
+        </p:nvSpPr>
+        <p:spPr/>
+        <p:txBody>
+          <a:bodyPr/>
+          <a:lstStyle/>
+          <a:p>
+            <a:r>
+              <a:rPr lang="en-US" dirty="0"/>
+              <a:t>Artificial application when Users can create clubs or audio chats to say “</a:t>
+            </a:r>
+            <a:r>
+              <a:rPr lang="en-US" dirty="0" err="1"/>
+              <a:t>Whats</a:t>
+            </a:r>
+            <a:r>
+              <a:rPr lang="en-US" dirty="0"/>
+              <a:t> Up” each other.</a:t>
+            </a:r>
+          </a:p>
+          <a:p>
+            <a:r>
+              <a:rPr lang="en-US" dirty="0"/>
+              <a:t>Users are a big company employees.</a:t>
+            </a:r>
+          </a:p>
+          <a:p>
+            <a:r>
+              <a:rPr lang="en-US" dirty="0"/>
+              <a:t>Main components:</a:t>
+            </a:r>
+          </a:p>
+          <a:p>
+            <a:pPr lvl="1"/>
+            <a:r>
+              <a:rPr lang="en-US" dirty="0" err="1"/>
+              <a:t>Whatsclub</a:t>
+            </a:r>
+            <a:r>
+              <a:rPr lang="en-US" dirty="0"/>
+              <a:t> Backend API on NodeJS (JS)</a:t>
+            </a:r>
+          </a:p>
+          <a:p>
+            <a:pPr lvl="1"/>
+            <a:r>
+              <a:rPr lang="en-US" dirty="0" err="1"/>
+              <a:t>Whatsclub</a:t>
+            </a:r>
+            <a:r>
+              <a:rPr lang="en-US" dirty="0"/>
+              <a:t> Mobile App on </a:t>
+            </a:r>
+            <a:r>
+              <a:rPr lang="en-US" dirty="0" err="1"/>
+              <a:t>ReactNative</a:t>
+            </a:r>
+            <a:r>
+              <a:rPr lang="en-US" dirty="0"/>
+              <a:t> (JS)</a:t>
+            </a:r>
+          </a:p>
+          <a:p>
+            <a:pPr lvl="1"/>
+            <a:r>
+              <a:rPr lang="en-US" dirty="0" err="1"/>
+              <a:t>Whatsclub</a:t>
+            </a:r>
+            <a:r>
+              <a:rPr lang="en-US" dirty="0"/>
+              <a:t> Web App on React (JS)</a:t>
+            </a:r>
+          </a:p>
+        </p:txBody>
+      </p:sp>
+    </p:spTree>
+    <p:extLst>
+      <p:ext uri="{BB962C8B-B14F-4D97-AF65-F5344CB8AC3E}">
+        <p14:creationId xmlns:p14="http://schemas.microsoft.com/office/powerpoint/2010/main" val="1754585726"/>
+      </p:ext>
+    </p:extLst>
+  </p:cSld>
+  <p:clrMapOvr>
+    <a:masterClrMapping/>
+  </p:clrMapOvr>
+</p:sld>
+</file>
+
+<file path=ppt/slides/slide5.xml><?xml version="1.0" encoding="utf-8"?>
 <p:sld xmlns:a="http://schemas.openxmlformats.org/drawingml/2006/main" xmlns:r="http://schemas.openxmlformats.org/officeDocument/2006/relationships" xmlns:p="http://schemas.openxmlformats.org/presentationml/2006/main">
   <p:cSld>
     <p:spTree>
@@ -3825,7 +4002,7 @@
 </p:sld>
 </file>
 
-<file path=ppt/slides/slide4.xml><?xml version="1.0" encoding="utf-8"?>
+<file path=ppt/slides/slide6.xml><?xml version="1.0" encoding="utf-8"?>
 <p:sld xmlns:a="http://schemas.openxmlformats.org/drawingml/2006/main" xmlns:r="http://schemas.openxmlformats.org/officeDocument/2006/relationships" xmlns:p="http://schemas.openxmlformats.org/presentationml/2006/main">
   <p:cSld>
     <p:spTree>
@@ -3919,278 +4096,6 @@
 </p:sld>
 </file>
 
-<file path=ppt/slides/slide5.xml><?xml version="1.0" encoding="utf-8"?>
-<p:sld xmlns:a="http://schemas.openxmlformats.org/drawingml/2006/main" xmlns:r="http://schemas.openxmlformats.org/officeDocument/2006/relationships" xmlns:p="http://schemas.openxmlformats.org/presentationml/2006/main">
-  <p:cSld>
-    <p:spTree>
-      <p:nvGrpSpPr>
-        <p:cNvPr id="1" name=""/>
-        <p:cNvGrpSpPr/>
-        <p:nvPr/>
-      </p:nvGrpSpPr>
-      <p:grpSpPr>
-        <a:xfrm>
-          <a:off x="0" y="0"/>
-          <a:ext cx="0" cy="0"/>
-          <a:chOff x="0" y="0"/>
-          <a:chExt cx="0" cy="0"/>
-        </a:xfrm>
-      </p:grpSpPr>
-      <p:sp>
-        <p:nvSpPr>
-          <p:cNvPr id="2" name="Title 1">
-            <a:extLst>
-              <a:ext uri="{FF2B5EF4-FFF2-40B4-BE49-F238E27FC236}">
-                <a16:creationId xmlns:a16="http://schemas.microsoft.com/office/drawing/2014/main" id="{133EA199-F266-439C-B851-523BAC855EC1}"/>
-              </a:ext>
-            </a:extLst>
-          </p:cNvPr>
-          <p:cNvSpPr>
-            <a:spLocks noGrp="1"/>
-          </p:cNvSpPr>
-          <p:nvPr>
-            <p:ph type="title"/>
-          </p:nvPr>
-        </p:nvSpPr>
-        <p:spPr>
-          <a:xfrm>
-            <a:off x="784860" y="349885"/>
-            <a:ext cx="10515600" cy="1325563"/>
-          </a:xfrm>
-        </p:spPr>
-        <p:txBody>
-          <a:bodyPr/>
-          <a:lstStyle/>
-          <a:p>
-            <a:r>
-              <a:rPr lang="en-US" dirty="0"/>
-              <a:t>New Feature</a:t>
-            </a:r>
-          </a:p>
-        </p:txBody>
-      </p:sp>
-      <p:pic>
-        <p:nvPicPr>
-          <p:cNvPr id="5" name="Content Placeholder 4">
-            <a:extLst>
-              <a:ext uri="{FF2B5EF4-FFF2-40B4-BE49-F238E27FC236}">
-                <a16:creationId xmlns:a16="http://schemas.microsoft.com/office/drawing/2014/main" id="{A147AC3B-2EE3-44A9-BC37-2BFFCBE24B12}"/>
-              </a:ext>
-            </a:extLst>
-          </p:cNvPr>
-          <p:cNvPicPr>
-            <a:picLocks noGrp="1" noChangeAspect="1"/>
-          </p:cNvPicPr>
-          <p:nvPr>
-            <p:ph idx="1"/>
-          </p:nvPr>
-        </p:nvPicPr>
-        <p:blipFill>
-          <a:blip r:embed="rId2">
-            <a:extLst>
-              <a:ext uri="{28A0092B-C50C-407E-A947-70E740481C1C}">
-                <a14:useLocalDpi xmlns:a14="http://schemas.microsoft.com/office/drawing/2010/main" val="0"/>
-              </a:ext>
-            </a:extLst>
-          </a:blip>
-          <a:stretch>
-            <a:fillRect/>
-          </a:stretch>
-        </p:blipFill>
-        <p:spPr>
-          <a:xfrm>
-            <a:off x="234453" y="2049780"/>
-            <a:ext cx="5432479" cy="3205163"/>
-          </a:xfrm>
-        </p:spPr>
-      </p:pic>
-      <p:pic>
-        <p:nvPicPr>
-          <p:cNvPr id="4" name="Picture 3">
-            <a:extLst>
-              <a:ext uri="{FF2B5EF4-FFF2-40B4-BE49-F238E27FC236}">
-                <a16:creationId xmlns:a16="http://schemas.microsoft.com/office/drawing/2014/main" id="{52756EA5-ECE8-475A-8217-F809E60AC3E8}"/>
-              </a:ext>
-            </a:extLst>
-          </p:cNvPr>
-          <p:cNvPicPr>
-            <a:picLocks noChangeAspect="1"/>
-          </p:cNvPicPr>
-          <p:nvPr/>
-        </p:nvPicPr>
-        <p:blipFill>
-          <a:blip r:embed="rId3">
-            <a:extLst>
-              <a:ext uri="{28A0092B-C50C-407E-A947-70E740481C1C}">
-                <a14:useLocalDpi xmlns:a14="http://schemas.microsoft.com/office/drawing/2010/main" val="0"/>
-              </a:ext>
-            </a:extLst>
-          </a:blip>
-          <a:stretch>
-            <a:fillRect/>
-          </a:stretch>
-        </p:blipFill>
-        <p:spPr>
-          <a:xfrm>
-            <a:off x="5838599" y="2049779"/>
-            <a:ext cx="6118948" cy="3205163"/>
-          </a:xfrm>
-          <a:prstGeom prst="rect">
-            <a:avLst/>
-          </a:prstGeom>
-        </p:spPr>
-      </p:pic>
-      <p:sp>
-        <p:nvSpPr>
-          <p:cNvPr id="6" name="TextBox 5">
-            <a:extLst>
-              <a:ext uri="{FF2B5EF4-FFF2-40B4-BE49-F238E27FC236}">
-                <a16:creationId xmlns:a16="http://schemas.microsoft.com/office/drawing/2014/main" id="{7E844E33-238D-4B4F-AFA9-302125E44CAE}"/>
-              </a:ext>
-            </a:extLst>
-          </p:cNvPr>
-          <p:cNvSpPr txBox="1"/>
-          <p:nvPr/>
-        </p:nvSpPr>
-        <p:spPr>
-          <a:xfrm>
-            <a:off x="4137660" y="1526559"/>
-            <a:ext cx="4503420" cy="523220"/>
-          </a:xfrm>
-          <a:prstGeom prst="rect">
-            <a:avLst/>
-          </a:prstGeom>
-          <a:noFill/>
-        </p:spPr>
-        <p:txBody>
-          <a:bodyPr wrap="square" rtlCol="0">
-            <a:spAutoFit/>
-          </a:bodyPr>
-          <a:lstStyle/>
-          <a:p>
-            <a:pPr algn="ctr"/>
-            <a:r>
-              <a:rPr lang="en-US" sz="2800" dirty="0"/>
-              <a:t>QR code vs Push Notification</a:t>
-            </a:r>
-          </a:p>
-        </p:txBody>
-      </p:sp>
-    </p:spTree>
-    <p:extLst>
-      <p:ext uri="{BB962C8B-B14F-4D97-AF65-F5344CB8AC3E}">
-        <p14:creationId xmlns:p14="http://schemas.microsoft.com/office/powerpoint/2010/main" val="3446321436"/>
-      </p:ext>
-    </p:extLst>
-  </p:cSld>
-  <p:clrMapOvr>
-    <a:masterClrMapping/>
-  </p:clrMapOvr>
-</p:sld>
-</file>
-
-<file path=ppt/slides/slide6.xml><?xml version="1.0" encoding="utf-8"?>
-<p:sld xmlns:a="http://schemas.openxmlformats.org/drawingml/2006/main" xmlns:r="http://schemas.openxmlformats.org/officeDocument/2006/relationships" xmlns:p="http://schemas.openxmlformats.org/presentationml/2006/main">
-  <p:cSld>
-    <p:spTree>
-      <p:nvGrpSpPr>
-        <p:cNvPr id="1" name=""/>
-        <p:cNvGrpSpPr/>
-        <p:nvPr/>
-      </p:nvGrpSpPr>
-      <p:grpSpPr>
-        <a:xfrm>
-          <a:off x="0" y="0"/>
-          <a:ext cx="0" cy="0"/>
-          <a:chOff x="0" y="0"/>
-          <a:chExt cx="0" cy="0"/>
-        </a:xfrm>
-      </p:grpSpPr>
-      <p:sp>
-        <p:nvSpPr>
-          <p:cNvPr id="2" name="Title 1">
-            <a:extLst>
-              <a:ext uri="{FF2B5EF4-FFF2-40B4-BE49-F238E27FC236}">
-                <a16:creationId xmlns:a16="http://schemas.microsoft.com/office/drawing/2014/main" id="{05A98678-BF03-44F9-94F0-678B42E15FEE}"/>
-              </a:ext>
-            </a:extLst>
-          </p:cNvPr>
-          <p:cNvSpPr>
-            <a:spLocks noGrp="1"/>
-          </p:cNvSpPr>
-          <p:nvPr>
-            <p:ph type="title"/>
-          </p:nvPr>
-        </p:nvSpPr>
-        <p:spPr/>
-        <p:txBody>
-          <a:bodyPr/>
-          <a:lstStyle/>
-          <a:p>
-            <a:r>
-              <a:rPr lang="en-US" dirty="0"/>
-              <a:t>Assumptions</a:t>
-            </a:r>
-          </a:p>
-        </p:txBody>
-      </p:sp>
-      <p:sp>
-        <p:nvSpPr>
-          <p:cNvPr id="3" name="Content Placeholder 2">
-            <a:extLst>
-              <a:ext uri="{FF2B5EF4-FFF2-40B4-BE49-F238E27FC236}">
-                <a16:creationId xmlns:a16="http://schemas.microsoft.com/office/drawing/2014/main" id="{DD1DBB8B-729B-4966-9C1E-2A46C5852705}"/>
-              </a:ext>
-            </a:extLst>
-          </p:cNvPr>
-          <p:cNvSpPr>
-            <a:spLocks noGrp="1"/>
-          </p:cNvSpPr>
-          <p:nvPr>
-            <p:ph idx="1"/>
-          </p:nvPr>
-        </p:nvSpPr>
-        <p:spPr/>
-        <p:txBody>
-          <a:bodyPr/>
-          <a:lstStyle/>
-          <a:p>
-            <a:r>
-              <a:rPr lang="en-US" dirty="0"/>
-              <a:t>MFA is enabled to login into Mobile App</a:t>
-            </a:r>
-          </a:p>
-          <a:p>
-            <a:r>
-              <a:rPr lang="en-US" dirty="0" err="1"/>
-              <a:t>PoC</a:t>
-            </a:r>
-            <a:endParaRPr lang="en-US" dirty="0"/>
-          </a:p>
-          <a:p>
-            <a:pPr marL="0" indent="0">
-              <a:buNone/>
-            </a:pPr>
-            <a:endParaRPr lang="en-US" dirty="0"/>
-          </a:p>
-          <a:p>
-            <a:endParaRPr lang="en-US" dirty="0"/>
-          </a:p>
-        </p:txBody>
-      </p:sp>
-    </p:spTree>
-    <p:extLst>
-      <p:ext uri="{BB962C8B-B14F-4D97-AF65-F5344CB8AC3E}">
-        <p14:creationId xmlns:p14="http://schemas.microsoft.com/office/powerpoint/2010/main" val="172485911"/>
-      </p:ext>
-    </p:extLst>
-  </p:cSld>
-  <p:clrMapOvr>
-    <a:masterClrMapping/>
-  </p:clrMapOvr>
-</p:sld>
-</file>
-
 <file path=ppt/slides/slide7.xml><?xml version="1.0" encoding="utf-8"?>
 <p:sld xmlns:a="http://schemas.openxmlformats.org/drawingml/2006/main" xmlns:r="http://schemas.openxmlformats.org/officeDocument/2006/relationships" xmlns:p="http://schemas.openxmlformats.org/presentationml/2006/main">
   <p:cSld>
@@ -4213,7 +4118,7 @@
           <p:cNvPr id="2" name="Title 1">
             <a:extLst>
               <a:ext uri="{FF2B5EF4-FFF2-40B4-BE49-F238E27FC236}">
-                <a16:creationId xmlns:a16="http://schemas.microsoft.com/office/drawing/2014/main" id="{A5A94723-1639-49C6-B4FC-0EFE23CB98A3}"/>
+                <a16:creationId xmlns:a16="http://schemas.microsoft.com/office/drawing/2014/main" id="{133EA199-F266-439C-B851-523BAC855EC1}"/>
               </a:ext>
             </a:extLst>
           </p:cNvPr>
@@ -4224,52 +4129,62 @@
             <p:ph type="title"/>
           </p:nvPr>
         </p:nvSpPr>
-        <p:spPr/>
+        <p:spPr>
+          <a:xfrm>
+            <a:off x="784860" y="349885"/>
+            <a:ext cx="10515600" cy="1325563"/>
+          </a:xfrm>
+        </p:spPr>
         <p:txBody>
           <a:bodyPr/>
           <a:lstStyle/>
           <a:p>
             <a:r>
               <a:rPr lang="en-US" dirty="0"/>
-              <a:t>Solution Design: QR code</a:t>
+              <a:t>New Feature</a:t>
             </a:r>
           </a:p>
         </p:txBody>
       </p:sp>
       <p:pic>
         <p:nvPicPr>
-          <p:cNvPr id="4" name="Picture 3">
-            <a:extLst>
-              <a:ext uri="{FF2B5EF4-FFF2-40B4-BE49-F238E27FC236}">
-                <a16:creationId xmlns:a16="http://schemas.microsoft.com/office/drawing/2014/main" id="{C90C6BCB-9BD1-4D57-A364-F86A4C14F114}"/>
+          <p:cNvPr id="5" name="Content Placeholder 4">
+            <a:extLst>
+              <a:ext uri="{FF2B5EF4-FFF2-40B4-BE49-F238E27FC236}">
+                <a16:creationId xmlns:a16="http://schemas.microsoft.com/office/drawing/2014/main" id="{A147AC3B-2EE3-44A9-BC37-2BFFCBE24B12}"/>
               </a:ext>
             </a:extLst>
           </p:cNvPr>
           <p:cNvPicPr>
-            <a:picLocks noChangeAspect="1"/>
+            <a:picLocks noGrp="1" noChangeAspect="1"/>
           </p:cNvPicPr>
-          <p:nvPr/>
+          <p:nvPr>
+            <p:ph idx="1"/>
+          </p:nvPr>
         </p:nvPicPr>
         <p:blipFill>
-          <a:blip r:embed="rId2"/>
+          <a:blip r:embed="rId2">
+            <a:extLst>
+              <a:ext uri="{28A0092B-C50C-407E-A947-70E740481C1C}">
+                <a14:useLocalDpi xmlns:a14="http://schemas.microsoft.com/office/drawing/2010/main" val="0"/>
+              </a:ext>
+            </a:extLst>
+          </a:blip>
           <a:stretch>
             <a:fillRect/>
           </a:stretch>
         </p:blipFill>
         <p:spPr>
           <a:xfrm>
-            <a:off x="4042818" y="1769962"/>
-            <a:ext cx="2416360" cy="3318075"/>
+            <a:off x="1912827" y="1491449"/>
+            <a:ext cx="8259665" cy="4873203"/>
           </a:xfrm>
-          <a:prstGeom prst="rect">
-            <a:avLst/>
-          </a:prstGeom>
         </p:spPr>
       </p:pic>
     </p:spTree>
     <p:extLst>
       <p:ext uri="{BB962C8B-B14F-4D97-AF65-F5344CB8AC3E}">
-        <p14:creationId xmlns:p14="http://schemas.microsoft.com/office/powerpoint/2010/main" val="1201741664"/>
+        <p14:creationId xmlns:p14="http://schemas.microsoft.com/office/powerpoint/2010/main" val="3446321436"/>
       </p:ext>
     </p:extLst>
   </p:cSld>
@@ -4312,52 +4227,30 @@
             <p:ph type="title"/>
           </p:nvPr>
         </p:nvSpPr>
-        <p:spPr/>
-        <p:txBody>
-          <a:bodyPr/>
-          <a:lstStyle/>
-          <a:p>
-            <a:r>
-              <a:rPr lang="en-US" dirty="0"/>
-              <a:t>Solution Design: Push Notification</a:t>
-            </a:r>
-          </a:p>
-        </p:txBody>
-      </p:sp>
-      <p:pic>
-        <p:nvPicPr>
-          <p:cNvPr id="4" name="Picture 3">
-            <a:extLst>
-              <a:ext uri="{FF2B5EF4-FFF2-40B4-BE49-F238E27FC236}">
-                <a16:creationId xmlns:a16="http://schemas.microsoft.com/office/drawing/2014/main" id="{C90C6BCB-9BD1-4D57-A364-F86A4C14F114}"/>
-              </a:ext>
-            </a:extLst>
-          </p:cNvPr>
-          <p:cNvPicPr>
-            <a:picLocks noChangeAspect="1"/>
-          </p:cNvPicPr>
-          <p:nvPr/>
-        </p:nvPicPr>
-        <p:blipFill>
-          <a:blip r:embed="rId2"/>
-          <a:stretch>
-            <a:fillRect/>
-          </a:stretch>
-        </p:blipFill>
         <p:spPr>
           <a:xfrm>
-            <a:off x="4042818" y="1769962"/>
-            <a:ext cx="2416360" cy="3318075"/>
+            <a:off x="838200" y="2766218"/>
+            <a:ext cx="10515600" cy="1325563"/>
           </a:xfrm>
-          <a:prstGeom prst="rect">
-            <a:avLst/>
-          </a:prstGeom>
         </p:spPr>
-      </p:pic>
+        <p:txBody>
+          <a:bodyPr>
+            <a:normAutofit/>
+          </a:bodyPr>
+          <a:lstStyle/>
+          <a:p>
+            <a:pPr algn="ctr"/>
+            <a:r>
+              <a:rPr lang="en-US" sz="6600" dirty="0"/>
+              <a:t>Demo</a:t>
+            </a:r>
+          </a:p>
+        </p:txBody>
+      </p:sp>
     </p:spTree>
     <p:extLst>
       <p:ext uri="{BB962C8B-B14F-4D97-AF65-F5344CB8AC3E}">
-        <p14:creationId xmlns:p14="http://schemas.microsoft.com/office/powerpoint/2010/main" val="3048520011"/>
+        <p14:creationId xmlns:p14="http://schemas.microsoft.com/office/powerpoint/2010/main" val="3243772517"/>
       </p:ext>
     </p:extLst>
   </p:cSld>
@@ -4400,22 +4293,14 @@
             <p:ph type="title"/>
           </p:nvPr>
         </p:nvSpPr>
-        <p:spPr>
-          <a:xfrm>
-            <a:off x="838200" y="2324258"/>
-            <a:ext cx="10515600" cy="1325563"/>
-          </a:xfrm>
-        </p:spPr>
-        <p:txBody>
-          <a:bodyPr>
-            <a:normAutofit/>
-          </a:bodyPr>
-          <a:lstStyle/>
-          <a:p>
-            <a:pPr algn="ctr"/>
-            <a:r>
-              <a:rPr lang="en-US" sz="6600" dirty="0"/>
-              <a:t>Implementation</a:t>
+        <p:spPr/>
+        <p:txBody>
+          <a:bodyPr/>
+          <a:lstStyle/>
+          <a:p>
+            <a:r>
+              <a:rPr lang="en-US" dirty="0"/>
+              <a:t>Solution Design</a:t>
             </a:r>
           </a:p>
         </p:txBody>
@@ -4423,7 +4308,7 @@
     </p:spTree>
     <p:extLst>
       <p:ext uri="{BB962C8B-B14F-4D97-AF65-F5344CB8AC3E}">
-        <p14:creationId xmlns:p14="http://schemas.microsoft.com/office/powerpoint/2010/main" val="3243772517"/>
+        <p14:creationId xmlns:p14="http://schemas.microsoft.com/office/powerpoint/2010/main" val="1201741664"/>
       </p:ext>
     </p:extLst>
   </p:cSld>

</xml_diff>

<commit_message>
Add mfa login into mobile app
</commit_message>
<xml_diff>
--- a/WhatsClub.pptx
+++ b/WhatsClub.pptx
@@ -14,8 +14,9 @@
     <p:sldId id="260" r:id="rId8"/>
     <p:sldId id="264" r:id="rId9"/>
     <p:sldId id="262" r:id="rId10"/>
-    <p:sldId id="271" r:id="rId11"/>
-    <p:sldId id="267" r:id="rId12"/>
+    <p:sldId id="272" r:id="rId11"/>
+    <p:sldId id="273" r:id="rId12"/>
+    <p:sldId id="267" r:id="rId13"/>
   </p:sldIdLst>
   <p:sldSz cx="12192000" cy="6858000"/>
   <p:notesSz cx="6858000" cy="9144000"/>
@@ -269,7 +270,7 @@
           <a:p>
             <a:fld id="{F15C8759-D5AC-422C-B7D3-B3F7D659B04E}" type="datetimeFigureOut">
               <a:rPr lang="en-US" smtClean="0"/>
-              <a:t>3/11/2021</a:t>
+              <a:t>3/19/2021</a:t>
             </a:fld>
             <a:endParaRPr lang="en-US"/>
           </a:p>
@@ -467,7 +468,7 @@
           <a:p>
             <a:fld id="{F15C8759-D5AC-422C-B7D3-B3F7D659B04E}" type="datetimeFigureOut">
               <a:rPr lang="en-US" smtClean="0"/>
-              <a:t>3/11/2021</a:t>
+              <a:t>3/19/2021</a:t>
             </a:fld>
             <a:endParaRPr lang="en-US"/>
           </a:p>
@@ -675,7 +676,7 @@
           <a:p>
             <a:fld id="{F15C8759-D5AC-422C-B7D3-B3F7D659B04E}" type="datetimeFigureOut">
               <a:rPr lang="en-US" smtClean="0"/>
-              <a:t>3/11/2021</a:t>
+              <a:t>3/19/2021</a:t>
             </a:fld>
             <a:endParaRPr lang="en-US"/>
           </a:p>
@@ -873,7 +874,7 @@
           <a:p>
             <a:fld id="{F15C8759-D5AC-422C-B7D3-B3F7D659B04E}" type="datetimeFigureOut">
               <a:rPr lang="en-US" smtClean="0"/>
-              <a:t>3/11/2021</a:t>
+              <a:t>3/19/2021</a:t>
             </a:fld>
             <a:endParaRPr lang="en-US"/>
           </a:p>
@@ -1148,7 +1149,7 @@
           <a:p>
             <a:fld id="{F15C8759-D5AC-422C-B7D3-B3F7D659B04E}" type="datetimeFigureOut">
               <a:rPr lang="en-US" smtClean="0"/>
-              <a:t>3/11/2021</a:t>
+              <a:t>3/19/2021</a:t>
             </a:fld>
             <a:endParaRPr lang="en-US"/>
           </a:p>
@@ -1413,7 +1414,7 @@
           <a:p>
             <a:fld id="{F15C8759-D5AC-422C-B7D3-B3F7D659B04E}" type="datetimeFigureOut">
               <a:rPr lang="en-US" smtClean="0"/>
-              <a:t>3/11/2021</a:t>
+              <a:t>3/19/2021</a:t>
             </a:fld>
             <a:endParaRPr lang="en-US"/>
           </a:p>
@@ -1825,7 +1826,7 @@
           <a:p>
             <a:fld id="{F15C8759-D5AC-422C-B7D3-B3F7D659B04E}" type="datetimeFigureOut">
               <a:rPr lang="en-US" smtClean="0"/>
-              <a:t>3/11/2021</a:t>
+              <a:t>3/19/2021</a:t>
             </a:fld>
             <a:endParaRPr lang="en-US"/>
           </a:p>
@@ -1966,7 +1967,7 @@
           <a:p>
             <a:fld id="{F15C8759-D5AC-422C-B7D3-B3F7D659B04E}" type="datetimeFigureOut">
               <a:rPr lang="en-US" smtClean="0"/>
-              <a:t>3/11/2021</a:t>
+              <a:t>3/19/2021</a:t>
             </a:fld>
             <a:endParaRPr lang="en-US"/>
           </a:p>
@@ -2079,7 +2080,7 @@
           <a:p>
             <a:fld id="{F15C8759-D5AC-422C-B7D3-B3F7D659B04E}" type="datetimeFigureOut">
               <a:rPr lang="en-US" smtClean="0"/>
-              <a:t>3/11/2021</a:t>
+              <a:t>3/19/2021</a:t>
             </a:fld>
             <a:endParaRPr lang="en-US"/>
           </a:p>
@@ -2390,7 +2391,7 @@
           <a:p>
             <a:fld id="{F15C8759-D5AC-422C-B7D3-B3F7D659B04E}" type="datetimeFigureOut">
               <a:rPr lang="en-US" smtClean="0"/>
-              <a:t>3/11/2021</a:t>
+              <a:t>3/19/2021</a:t>
             </a:fld>
             <a:endParaRPr lang="en-US"/>
           </a:p>
@@ -2678,7 +2679,7 @@
           <a:p>
             <a:fld id="{F15C8759-D5AC-422C-B7D3-B3F7D659B04E}" type="datetimeFigureOut">
               <a:rPr lang="en-US" smtClean="0"/>
-              <a:t>3/11/2021</a:t>
+              <a:t>3/19/2021</a:t>
             </a:fld>
             <a:endParaRPr lang="en-US"/>
           </a:p>
@@ -2919,7 +2920,7 @@
           <a:p>
             <a:fld id="{F15C8759-D5AC-422C-B7D3-B3F7D659B04E}" type="datetimeFigureOut">
               <a:rPr lang="en-US" smtClean="0"/>
-              <a:t>3/11/2021</a:t>
+              <a:t>3/19/2021</a:t>
             </a:fld>
             <a:endParaRPr lang="en-US"/>
           </a:p>
@@ -3463,7 +3464,7 @@
     </p:spTree>
     <p:extLst>
       <p:ext uri="{BB962C8B-B14F-4D97-AF65-F5344CB8AC3E}">
-        <p14:creationId xmlns:p14="http://schemas.microsoft.com/office/powerpoint/2010/main" val="404807634"/>
+        <p14:creationId xmlns:p14="http://schemas.microsoft.com/office/powerpoint/2010/main" val="2079400630"/>
       </p:ext>
     </p:extLst>
   </p:cSld>
@@ -3474,6 +3475,122 @@
 </file>
 
 <file path=ppt/slides/slide11.xml><?xml version="1.0" encoding="utf-8"?>
+<p:sld xmlns:a="http://schemas.openxmlformats.org/drawingml/2006/main" xmlns:r="http://schemas.openxmlformats.org/officeDocument/2006/relationships" xmlns:p="http://schemas.openxmlformats.org/presentationml/2006/main">
+  <p:cSld>
+    <p:spTree>
+      <p:nvGrpSpPr>
+        <p:cNvPr id="1" name=""/>
+        <p:cNvGrpSpPr/>
+        <p:nvPr/>
+      </p:nvGrpSpPr>
+      <p:grpSpPr>
+        <a:xfrm>
+          <a:off x="0" y="0"/>
+          <a:ext cx="0" cy="0"/>
+          <a:chOff x="0" y="0"/>
+          <a:chExt cx="0" cy="0"/>
+        </a:xfrm>
+      </p:grpSpPr>
+      <p:sp>
+        <p:nvSpPr>
+          <p:cNvPr id="2" name="Title 1">
+            <a:extLst>
+              <a:ext uri="{FF2B5EF4-FFF2-40B4-BE49-F238E27FC236}">
+                <a16:creationId xmlns:a16="http://schemas.microsoft.com/office/drawing/2014/main" id="{3146F147-3BC0-4796-986E-198D3134B891}"/>
+              </a:ext>
+            </a:extLst>
+          </p:cNvPr>
+          <p:cNvSpPr>
+            <a:spLocks noGrp="1"/>
+          </p:cNvSpPr>
+          <p:nvPr>
+            <p:ph type="title"/>
+          </p:nvPr>
+        </p:nvSpPr>
+        <p:spPr/>
+        <p:txBody>
+          <a:bodyPr/>
+          <a:lstStyle/>
+          <a:p>
+            <a:r>
+              <a:rPr lang="en-US" dirty="0"/>
+              <a:t>What about Production?</a:t>
+            </a:r>
+          </a:p>
+        </p:txBody>
+      </p:sp>
+      <p:sp>
+        <p:nvSpPr>
+          <p:cNvPr id="3" name="Content Placeholder 2">
+            <a:extLst>
+              <a:ext uri="{FF2B5EF4-FFF2-40B4-BE49-F238E27FC236}">
+                <a16:creationId xmlns:a16="http://schemas.microsoft.com/office/drawing/2014/main" id="{67338530-DA50-4F27-AA3D-2246BFF7112E}"/>
+              </a:ext>
+            </a:extLst>
+          </p:cNvPr>
+          <p:cNvSpPr>
+            <a:spLocks noGrp="1"/>
+          </p:cNvSpPr>
+          <p:nvPr>
+            <p:ph idx="1"/>
+          </p:nvPr>
+        </p:nvSpPr>
+        <p:spPr/>
+        <p:txBody>
+          <a:bodyPr/>
+          <a:lstStyle/>
+          <a:p>
+            <a:r>
+              <a:rPr lang="en-US" dirty="0"/>
+              <a:t>Scaling server side?</a:t>
+            </a:r>
+          </a:p>
+          <a:p>
+            <a:r>
+              <a:rPr lang="en-US" dirty="0"/>
+              <a:t>JavaScript -&gt; TypeScript</a:t>
+            </a:r>
+          </a:p>
+          <a:p>
+            <a:r>
+              <a:rPr lang="en-US" dirty="0"/>
+              <a:t>Express -&gt; Nest.js</a:t>
+            </a:r>
+          </a:p>
+          <a:p>
+            <a:r>
+              <a:rPr lang="en-US" dirty="0"/>
+              <a:t>+ Unit tests</a:t>
+            </a:r>
+          </a:p>
+          <a:p>
+            <a:r>
+              <a:rPr lang="en-US" dirty="0"/>
+              <a:t>+ React Component tests</a:t>
+            </a:r>
+          </a:p>
+          <a:p>
+            <a:r>
+              <a:rPr lang="en-US" dirty="0"/>
+              <a:t>+ E2E test</a:t>
+            </a:r>
+          </a:p>
+        </p:txBody>
+      </p:sp>
+    </p:spTree>
+    <p:extLst>
+      <p:ext uri="{BB962C8B-B14F-4D97-AF65-F5344CB8AC3E}">
+        <p14:creationId xmlns:p14="http://schemas.microsoft.com/office/powerpoint/2010/main" val="3277761484"/>
+      </p:ext>
+    </p:extLst>
+  </p:cSld>
+  <p:clrMapOvr>
+    <a:masterClrMapping/>
+  </p:clrMapOvr>
+</p:sld>
+</file>
+
+<file path=ppt/slides/slide12.xml><?xml version="1.0" encoding="utf-8"?>
 <p:sld xmlns:a="http://schemas.openxmlformats.org/drawingml/2006/main" xmlns:r="http://schemas.openxmlformats.org/officeDocument/2006/relationships" xmlns:p="http://schemas.openxmlformats.org/presentationml/2006/main">
   <p:cSld>
     <p:spTree>

</xml_diff>